<commit_message>
change color for step 3 and FINAL presentation
</commit_message>
<xml_diff>
--- a/presentation/old ppt versions/20180713 Gruppe 5 - step2.pptx
+++ b/presentation/old ppt versions/20180713 Gruppe 5 - step2.pptx
@@ -7106,7 +7106,7 @@
             <a:fld id="{A32DC80D-291A-4ABB-A78B-0417274A267C}" type="datetime4">
               <a:rPr lang="de-DE"/>
               <a:pPr/>
-              <a:t>12. Juli 2018</a:t>
+              <a:t>13. Juli 2018</a:t>
             </a:fld>
             <a:endParaRPr lang="de-DE"/>
           </a:p>
@@ -7489,7 +7489,7 @@
             <a:fld id="{065B079B-E513-489A-8A1B-D7C78493EA86}" type="datetime4">
               <a:rPr lang="de-DE"/>
               <a:pPr/>
-              <a:t>12. Juli 2018</a:t>
+              <a:t>13. Juli 2018</a:t>
             </a:fld>
             <a:endParaRPr lang="de-DE"/>
           </a:p>
@@ -8126,7 +8126,7 @@
             <a:fld id="{065B079B-E513-489A-8A1B-D7C78493EA86}" type="datetime4">
               <a:rPr lang="de-DE" smtClean="0"/>
               <a:pPr/>
-              <a:t>12. Juli 2018</a:t>
+              <a:t>13. Juli 2018</a:t>
             </a:fld>
             <a:endParaRPr lang="de-DE"/>
           </a:p>
@@ -8261,7 +8261,7 @@
             <a:fld id="{065B079B-E513-489A-8A1B-D7C78493EA86}" type="datetime4">
               <a:rPr lang="de-DE" smtClean="0"/>
               <a:pPr/>
-              <a:t>12. Juli 2018</a:t>
+              <a:t>13. Juli 2018</a:t>
             </a:fld>
             <a:endParaRPr lang="de-DE"/>
           </a:p>
@@ -8401,7 +8401,7 @@
             <a:fld id="{065B079B-E513-489A-8A1B-D7C78493EA86}" type="datetime4">
               <a:rPr lang="de-DE" smtClean="0"/>
               <a:pPr/>
-              <a:t>12. Juli 2018</a:t>
+              <a:t>13. Juli 2018</a:t>
             </a:fld>
             <a:endParaRPr lang="de-DE"/>
           </a:p>
@@ -8573,7 +8573,7 @@
             <a:fld id="{065B079B-E513-489A-8A1B-D7C78493EA86}" type="datetime4">
               <a:rPr lang="de-DE" smtClean="0"/>
               <a:pPr/>
-              <a:t>12. Juli 2018</a:t>
+              <a:t>13. Juli 2018</a:t>
             </a:fld>
             <a:endParaRPr lang="de-DE"/>
           </a:p>
@@ -8880,7 +8880,7 @@
             <a:fld id="{065B079B-E513-489A-8A1B-D7C78493EA86}" type="datetime4">
               <a:rPr lang="de-DE" smtClean="0"/>
               <a:pPr/>
-              <a:t>12. Juli 2018</a:t>
+              <a:t>13. Juli 2018</a:t>
             </a:fld>
             <a:endParaRPr lang="de-DE"/>
           </a:p>
@@ -9020,7 +9020,7 @@
             <a:fld id="{065B079B-E513-489A-8A1B-D7C78493EA86}" type="datetime4">
               <a:rPr lang="de-DE" smtClean="0"/>
               <a:pPr/>
-              <a:t>12. Juli 2018</a:t>
+              <a:t>13. Juli 2018</a:t>
             </a:fld>
             <a:endParaRPr lang="de-DE"/>
           </a:p>
@@ -9340,7 +9340,7 @@
             <a:fld id="{065B079B-E513-489A-8A1B-D7C78493EA86}" type="datetime4">
               <a:rPr lang="de-DE" smtClean="0"/>
               <a:pPr/>
-              <a:t>12. Juli 2018</a:t>
+              <a:t>13. Juli 2018</a:t>
             </a:fld>
             <a:endParaRPr lang="de-DE"/>
           </a:p>
@@ -9480,7 +9480,7 @@
             <a:fld id="{065B079B-E513-489A-8A1B-D7C78493EA86}" type="datetime4">
               <a:rPr lang="de-DE" smtClean="0"/>
               <a:pPr/>
-              <a:t>12. Juli 2018</a:t>
+              <a:t>13. Juli 2018</a:t>
             </a:fld>
             <a:endParaRPr lang="de-DE"/>
           </a:p>
@@ -9620,7 +9620,7 @@
             <a:fld id="{065B079B-E513-489A-8A1B-D7C78493EA86}" type="datetime4">
               <a:rPr lang="de-DE" smtClean="0"/>
               <a:pPr/>
-              <a:t>12. Juli 2018</a:t>
+              <a:t>13. Juli 2018</a:t>
             </a:fld>
             <a:endParaRPr lang="de-DE"/>
           </a:p>
@@ -9760,7 +9760,7 @@
             <a:fld id="{065B079B-E513-489A-8A1B-D7C78493EA86}" type="datetime4">
               <a:rPr lang="de-DE" smtClean="0"/>
               <a:pPr/>
-              <a:t>12. Juli 2018</a:t>
+              <a:t>13. Juli 2018</a:t>
             </a:fld>
             <a:endParaRPr lang="de-DE"/>
           </a:p>
@@ -20810,30 +20810,6 @@
           </a:p>
         </p:txBody>
       </p:sp>
-      <p:pic>
-        <p:nvPicPr>
-          <p:cNvPr id="12" name="Grafik 11" descr="AutoTS__Praesentation_Beispielgraph_2_mit_Auswahl.png"/>
-          <p:cNvPicPr>
-            <a:picLocks noChangeAspect="1"/>
-          </p:cNvPicPr>
-          <p:nvPr/>
-        </p:nvPicPr>
-        <p:blipFill>
-          <a:blip r:embed="rId2" cstate="print"/>
-          <a:stretch>
-            <a:fillRect/>
-          </a:stretch>
-        </p:blipFill>
-        <p:spPr>
-          <a:xfrm>
-            <a:off x="1151620" y="2420889"/>
-            <a:ext cx="6840759" cy="3758268"/>
-          </a:xfrm>
-          <a:prstGeom prst="rect">
-            <a:avLst/>
-          </a:prstGeom>
-        </p:spPr>
-      </p:pic>
       <p:sp>
         <p:nvSpPr>
           <p:cNvPr id="9" name="Pfeil: Chevron 8">
@@ -21037,6 +21013,36 @@
           </a:p>
         </p:txBody>
       </p:sp>
+      <p:pic>
+        <p:nvPicPr>
+          <p:cNvPr id="8" name="Grafik 7" descr="AutoTS__Praesentation_Beispielgraph_2_mit_Auswahl.png">
+            <a:extLst>
+              <a:ext uri="{FF2B5EF4-FFF2-40B4-BE49-F238E27FC236}">
+                <a16:creationId xmlns:a16="http://schemas.microsoft.com/office/drawing/2014/main" id="{592F73CE-A564-46C7-85B9-8D05C326AEBC}"/>
+              </a:ext>
+            </a:extLst>
+          </p:cNvPr>
+          <p:cNvPicPr>
+            <a:picLocks noChangeAspect="1"/>
+          </p:cNvPicPr>
+          <p:nvPr/>
+        </p:nvPicPr>
+        <p:blipFill>
+          <a:blip r:embed="rId2" cstate="print"/>
+          <a:stretch>
+            <a:fillRect/>
+          </a:stretch>
+        </p:blipFill>
+        <p:spPr>
+          <a:xfrm>
+            <a:off x="1215332" y="2556540"/>
+            <a:ext cx="6585444" cy="3618000"/>
+          </a:xfrm>
+          <a:prstGeom prst="rect">
+            <a:avLst/>
+          </a:prstGeom>
+        </p:spPr>
+      </p:pic>
     </p:spTree>
     <p:extLst>
       <p:ext uri="{BB962C8B-B14F-4D97-AF65-F5344CB8AC3E}">
@@ -21184,30 +21190,6 @@
           </a:p>
         </p:txBody>
       </p:sp>
-      <p:pic>
-        <p:nvPicPr>
-          <p:cNvPr id="12" name="Grafik 11" descr="AutoTS__Praesentation_Beispielgraph_2_mit_Auswahl.png"/>
-          <p:cNvPicPr>
-            <a:picLocks noChangeAspect="1"/>
-          </p:cNvPicPr>
-          <p:nvPr/>
-        </p:nvPicPr>
-        <p:blipFill>
-          <a:blip r:embed="rId2" cstate="print"/>
-          <a:stretch>
-            <a:fillRect/>
-          </a:stretch>
-        </p:blipFill>
-        <p:spPr>
-          <a:xfrm>
-            <a:off x="1151620" y="2420889"/>
-            <a:ext cx="6840760" cy="3758268"/>
-          </a:xfrm>
-          <a:prstGeom prst="rect">
-            <a:avLst/>
-          </a:prstGeom>
-        </p:spPr>
-      </p:pic>
       <p:sp>
         <p:nvSpPr>
           <p:cNvPr id="9" name="Pfeil: Chevron 8">
@@ -21411,6 +21393,36 @@
           </a:p>
         </p:txBody>
       </p:sp>
+      <p:pic>
+        <p:nvPicPr>
+          <p:cNvPr id="8" name="Grafik 7" descr="AutoTS__Praesentation_Beispielgraph_2_mit_Auswahl.png">
+            <a:extLst>
+              <a:ext uri="{FF2B5EF4-FFF2-40B4-BE49-F238E27FC236}">
+                <a16:creationId xmlns:a16="http://schemas.microsoft.com/office/drawing/2014/main" id="{55F1C206-784F-4189-90ED-AC9B151F608F}"/>
+              </a:ext>
+            </a:extLst>
+          </p:cNvPr>
+          <p:cNvPicPr>
+            <a:picLocks noChangeAspect="1"/>
+          </p:cNvPicPr>
+          <p:nvPr/>
+        </p:nvPicPr>
+        <p:blipFill>
+          <a:blip r:embed="rId2" cstate="print"/>
+          <a:stretch>
+            <a:fillRect/>
+          </a:stretch>
+        </p:blipFill>
+        <p:spPr>
+          <a:xfrm>
+            <a:off x="1215332" y="2556540"/>
+            <a:ext cx="6585445" cy="3618000"/>
+          </a:xfrm>
+          <a:prstGeom prst="rect">
+            <a:avLst/>
+          </a:prstGeom>
+        </p:spPr>
+      </p:pic>
     </p:spTree>
     <p:extLst>
       <p:ext uri="{BB962C8B-B14F-4D97-AF65-F5344CB8AC3E}">
@@ -21542,30 +21554,6 @@
           </a:p>
         </p:txBody>
       </p:sp>
-      <p:pic>
-        <p:nvPicPr>
-          <p:cNvPr id="12" name="Grafik 11" descr="AutoTS__Praesentation_Beispielgraph_2_mit_Auswahl.png"/>
-          <p:cNvPicPr>
-            <a:picLocks noChangeAspect="1"/>
-          </p:cNvPicPr>
-          <p:nvPr/>
-        </p:nvPicPr>
-        <p:blipFill>
-          <a:blip r:embed="rId2" cstate="print"/>
-          <a:stretch>
-            <a:fillRect/>
-          </a:stretch>
-        </p:blipFill>
-        <p:spPr>
-          <a:xfrm>
-            <a:off x="1044824" y="2420887"/>
-            <a:ext cx="7190348" cy="3780000"/>
-          </a:xfrm>
-          <a:prstGeom prst="rect">
-            <a:avLst/>
-          </a:prstGeom>
-        </p:spPr>
-      </p:pic>
       <p:sp>
         <p:nvSpPr>
           <p:cNvPr id="9" name="Pfeil: Chevron 8">
@@ -21769,6 +21757,36 @@
           </a:p>
         </p:txBody>
       </p:sp>
+      <p:pic>
+        <p:nvPicPr>
+          <p:cNvPr id="8" name="Grafik 7" descr="AutoTS__Praesentation_Beispielgraph_2_mit_Auswahl.png">
+            <a:extLst>
+              <a:ext uri="{FF2B5EF4-FFF2-40B4-BE49-F238E27FC236}">
+                <a16:creationId xmlns:a16="http://schemas.microsoft.com/office/drawing/2014/main" id="{4B061075-8760-45E6-9B71-78202EDC90AE}"/>
+              </a:ext>
+            </a:extLst>
+          </p:cNvPr>
+          <p:cNvPicPr>
+            <a:picLocks noChangeAspect="1"/>
+          </p:cNvPicPr>
+          <p:nvPr/>
+        </p:nvPicPr>
+        <p:blipFill>
+          <a:blip r:embed="rId2" cstate="print"/>
+          <a:stretch>
+            <a:fillRect/>
+          </a:stretch>
+        </p:blipFill>
+        <p:spPr>
+          <a:xfrm>
+            <a:off x="1115616" y="2561521"/>
+            <a:ext cx="6882190" cy="3618000"/>
+          </a:xfrm>
+          <a:prstGeom prst="rect">
+            <a:avLst/>
+          </a:prstGeom>
+        </p:spPr>
+      </p:pic>
     </p:spTree>
     <p:extLst>
       <p:ext uri="{BB962C8B-B14F-4D97-AF65-F5344CB8AC3E}">
@@ -21900,30 +21918,6 @@
           </a:p>
         </p:txBody>
       </p:sp>
-      <p:pic>
-        <p:nvPicPr>
-          <p:cNvPr id="12" name="Grafik 11" descr="AutoTS__Praesentation_Beispielgraph_2_mit_Auswahl.png"/>
-          <p:cNvPicPr>
-            <a:picLocks noChangeAspect="1"/>
-          </p:cNvPicPr>
-          <p:nvPr/>
-        </p:nvPicPr>
-        <p:blipFill>
-          <a:blip r:embed="rId2" cstate="print"/>
-          <a:stretch>
-            <a:fillRect/>
-          </a:stretch>
-        </p:blipFill>
-        <p:spPr>
-          <a:xfrm>
-            <a:off x="1151620" y="2424515"/>
-            <a:ext cx="6840760" cy="3751016"/>
-          </a:xfrm>
-          <a:prstGeom prst="rect">
-            <a:avLst/>
-          </a:prstGeom>
-        </p:spPr>
-      </p:pic>
       <p:sp>
         <p:nvSpPr>
           <p:cNvPr id="9" name="Pfeil: Chevron 8">
@@ -22127,6 +22121,36 @@
           </a:p>
         </p:txBody>
       </p:sp>
+      <p:pic>
+        <p:nvPicPr>
+          <p:cNvPr id="8" name="Grafik 7" descr="AutoTS__Praesentation_Beispielgraph_2_mit_Auswahl.png">
+            <a:extLst>
+              <a:ext uri="{FF2B5EF4-FFF2-40B4-BE49-F238E27FC236}">
+                <a16:creationId xmlns:a16="http://schemas.microsoft.com/office/drawing/2014/main" id="{4FF76654-2A95-4314-ACA4-33F1C4A8CAAA}"/>
+              </a:ext>
+            </a:extLst>
+          </p:cNvPr>
+          <p:cNvPicPr>
+            <a:picLocks noChangeAspect="1"/>
+          </p:cNvPicPr>
+          <p:nvPr/>
+        </p:nvPicPr>
+        <p:blipFill>
+          <a:blip r:embed="rId2" cstate="print"/>
+          <a:stretch>
+            <a:fillRect/>
+          </a:stretch>
+        </p:blipFill>
+        <p:spPr>
+          <a:xfrm>
+            <a:off x="1151621" y="2424515"/>
+            <a:ext cx="6840758" cy="3751016"/>
+          </a:xfrm>
+          <a:prstGeom prst="rect">
+            <a:avLst/>
+          </a:prstGeom>
+        </p:spPr>
+      </p:pic>
     </p:spTree>
     <p:extLst>
       <p:ext uri="{BB962C8B-B14F-4D97-AF65-F5344CB8AC3E}">
@@ -22475,30 +22499,6 @@
           </a:p>
         </p:txBody>
       </p:sp>
-      <p:pic>
-        <p:nvPicPr>
-          <p:cNvPr id="12" name="Grafik 11" descr="AutoTS__Praesentation_Beispielgraph_2_mit_Auswahl.png"/>
-          <p:cNvPicPr>
-            <a:picLocks noChangeAspect="1"/>
-          </p:cNvPicPr>
-          <p:nvPr/>
-        </p:nvPicPr>
-        <p:blipFill>
-          <a:blip r:embed="rId2" cstate="print"/>
-          <a:stretch>
-            <a:fillRect/>
-          </a:stretch>
-        </p:blipFill>
-        <p:spPr>
-          <a:xfrm>
-            <a:off x="1151620" y="2420889"/>
-            <a:ext cx="6840759" cy="3758268"/>
-          </a:xfrm>
-          <a:prstGeom prst="rect">
-            <a:avLst/>
-          </a:prstGeom>
-        </p:spPr>
-      </p:pic>
       <p:sp>
         <p:nvSpPr>
           <p:cNvPr id="9" name="Pfeil: Chevron 8">
@@ -22702,6 +22702,36 @@
           </a:p>
         </p:txBody>
       </p:sp>
+      <p:pic>
+        <p:nvPicPr>
+          <p:cNvPr id="8" name="Grafik 7" descr="AutoTS__Praesentation_Beispielgraph_2_mit_Auswahl.png">
+            <a:extLst>
+              <a:ext uri="{FF2B5EF4-FFF2-40B4-BE49-F238E27FC236}">
+                <a16:creationId xmlns:a16="http://schemas.microsoft.com/office/drawing/2014/main" id="{DB0A2857-99F0-46A3-85E8-949572CCE261}"/>
+              </a:ext>
+            </a:extLst>
+          </p:cNvPr>
+          <p:cNvPicPr>
+            <a:picLocks noChangeAspect="1"/>
+          </p:cNvPicPr>
+          <p:nvPr/>
+        </p:nvPicPr>
+        <p:blipFill>
+          <a:blip r:embed="rId2" cstate="print"/>
+          <a:stretch>
+            <a:fillRect/>
+          </a:stretch>
+        </p:blipFill>
+        <p:spPr>
+          <a:xfrm>
+            <a:off x="1215332" y="2556540"/>
+            <a:ext cx="6585444" cy="3618000"/>
+          </a:xfrm>
+          <a:prstGeom prst="rect">
+            <a:avLst/>
+          </a:prstGeom>
+        </p:spPr>
+      </p:pic>
     </p:spTree>
     <p:extLst>
       <p:ext uri="{BB962C8B-B14F-4D97-AF65-F5344CB8AC3E}">

</xml_diff>